<commit_message>
distinguishing embedded camel vs platform usage
</commit_message>
<xml_diff>
--- a/adocs/documentation/src/main/asciidoc/starter-app/_images/module-dependencies.pptx
+++ b/adocs/documentation/src/main/asciidoc/starter-app/_images/module-dependencies.pptx
@@ -104,7 +104,16 @@
       </a:defRPr>
     </a:lvl9pPr>
   </p:defaultTextStyle>
+  <p:extLst>
+    <p:ext uri="{EFAFB233-063F-42B5-8137-9DF3F51BA10A}">
+      <p15:sldGuideLst xmlns:p15="http://schemas.microsoft.com/office/powerpoint/2012/main"/>
+    </p:ext>
+  </p:extLst>
 </p:presentation>
+</file>
+
+<file path=ppt/revisionInfo.xml><?xml version="1.0" encoding="utf-8"?>
+<p1510:revInfo xmlns:a="http://schemas.openxmlformats.org/drawingml/2006/main" xmlns:r="http://schemas.openxmlformats.org/officeDocument/2006/relationships" xmlns:p1510="http://schemas.microsoft.com/office/powerpoint/2015/10/main"/>
 </file>
 
 <file path=ppt/slideLayouts/slideLayout1.xml><?xml version="1.0" encoding="utf-8"?>
@@ -3356,8 +3365,8 @@
         </p:nvSpPr>
         <p:spPr>
           <a:xfrm>
-            <a:off x="1828795" y="61783"/>
-            <a:ext cx="10181973" cy="6746789"/>
+            <a:off x="1808917" y="1006009"/>
+            <a:ext cx="3147773" cy="5802562"/>
           </a:xfrm>
           <a:prstGeom prst="rect">
             <a:avLst/>
@@ -3391,10 +3400,10 @@
       </p:sp>
       <p:sp>
         <p:nvSpPr>
-          <p:cNvPr id="4" name="Rectangle 3">
-            <a:extLst>
-              <a:ext uri="{FF2B5EF4-FFF2-40B4-BE49-F238E27FC236}">
-                <a16:creationId xmlns:a16="http://schemas.microsoft.com/office/drawing/2014/main" id="{69906B7B-9CED-4534-985F-1D44228CFBCA}"/>
+          <p:cNvPr id="112" name="Rectangle 111">
+            <a:extLst>
+              <a:ext uri="{FF2B5EF4-FFF2-40B4-BE49-F238E27FC236}">
+                <a16:creationId xmlns:a16="http://schemas.microsoft.com/office/drawing/2014/main" id="{0A5AC652-E085-4895-8D11-8178B99CBC13}"/>
               </a:ext>
             </a:extLst>
           </p:cNvPr>
@@ -3403,8 +3412,65 @@
         </p:nvSpPr>
         <p:spPr>
           <a:xfrm>
-            <a:off x="2190424" y="2609800"/>
-            <a:ext cx="2900560" cy="960781"/>
+            <a:off x="8672566" y="1490702"/>
+            <a:ext cx="3124854" cy="5031648"/>
+          </a:xfrm>
+          <a:prstGeom prst="rect">
+            <a:avLst/>
+          </a:prstGeom>
+          <a:ln>
+            <a:prstDash val="sysDash"/>
+          </a:ln>
+        </p:spPr>
+        <p:style>
+          <a:lnRef idx="2">
+            <a:schemeClr val="accent1"/>
+          </a:lnRef>
+          <a:fillRef idx="1">
+            <a:schemeClr val="lt1"/>
+          </a:fillRef>
+          <a:effectRef idx="0">
+            <a:schemeClr val="accent1"/>
+          </a:effectRef>
+          <a:fontRef idx="minor">
+            <a:schemeClr val="dk1"/>
+          </a:fontRef>
+        </p:style>
+        <p:txBody>
+          <a:bodyPr rtlCol="0" anchor="b" anchorCtr="0"/>
+          <a:lstStyle/>
+          <a:p>
+            <a:pPr algn="r"/>
+            <a:r>
+              <a:rPr lang="en-GB" dirty="0"/>
+              <a:t>example</a:t>
+            </a:r>
+            <a:br>
+              <a:rPr lang="en-GB" dirty="0"/>
+            </a:br>
+            <a:r>
+              <a:rPr lang="en-GB" dirty="0"/>
+              <a:t>embedded camel</a:t>
+            </a:r>
+          </a:p>
+        </p:txBody>
+      </p:sp>
+      <p:sp>
+        <p:nvSpPr>
+          <p:cNvPr id="4" name="Rectangle 3">
+            <a:extLst>
+              <a:ext uri="{FF2B5EF4-FFF2-40B4-BE49-F238E27FC236}">
+                <a16:creationId xmlns:a16="http://schemas.microsoft.com/office/drawing/2014/main" id="{69906B7B-9CED-4534-985F-1D44228CFBCA}"/>
+              </a:ext>
+            </a:extLst>
+          </p:cNvPr>
+          <p:cNvSpPr/>
+          <p:nvPr/>
+        </p:nvSpPr>
+        <p:spPr>
+          <a:xfrm>
+            <a:off x="2075852" y="3441284"/>
+            <a:ext cx="2604565" cy="690847"/>
           </a:xfrm>
           <a:prstGeom prst="rect">
             <a:avLst/>
@@ -3464,12 +3530,15 @@
         </p:nvSpPr>
         <p:spPr>
           <a:xfrm>
-            <a:off x="5993027" y="939113"/>
-            <a:ext cx="5647039" cy="5721177"/>
+            <a:off x="5198637" y="1490701"/>
+            <a:ext cx="3206130" cy="5031648"/>
           </a:xfrm>
           <a:prstGeom prst="rect">
             <a:avLst/>
           </a:prstGeom>
+          <a:ln>
+            <a:prstDash val="sysDash"/>
+          </a:ln>
         </p:spPr>
         <p:style>
           <a:lnRef idx="2">
@@ -3486,24 +3555,20 @@
           </a:fontRef>
         </p:style>
         <p:txBody>
-          <a:bodyPr rtlCol="0" anchor="t" anchorCtr="0"/>
-          <a:lstStyle/>
-          <a:p>
-            <a:r>
-              <a:rPr lang="en-GB" dirty="0" err="1"/>
-              <a:t>incode</a:t>
-            </a:r>
+          <a:bodyPr rtlCol="0" anchor="b" anchorCtr="0"/>
+          <a:lstStyle/>
+          <a:p>
+            <a:pPr algn="r"/>
             <a:r>
               <a:rPr lang="en-GB" dirty="0"/>
-              <a:t>-</a:t>
-            </a:r>
-            <a:r>
-              <a:rPr lang="en-GB" dirty="0" err="1"/>
-              <a:t>domainapp</a:t>
-            </a:r>
-            <a:r>
+              <a:t>example</a:t>
+            </a:r>
+            <a:br>
               <a:rPr lang="en-GB" dirty="0"/>
-              <a:t>-example</a:t>
+            </a:br>
+            <a:r>
+              <a:rPr lang="en-GB" dirty="0"/>
+              <a:t>platform usage</a:t>
             </a:r>
           </a:p>
         </p:txBody>
@@ -3522,8 +3587,8 @@
         </p:nvSpPr>
         <p:spPr>
           <a:xfrm>
-            <a:off x="7001261" y="1448447"/>
-            <a:ext cx="2900560" cy="960781"/>
+            <a:off x="5413141" y="2437968"/>
+            <a:ext cx="2604565" cy="690847"/>
           </a:xfrm>
           <a:prstGeom prst="rect">
             <a:avLst/>
@@ -3587,8 +3652,8 @@
         </p:nvSpPr>
         <p:spPr>
           <a:xfrm>
-            <a:off x="8515026" y="5481009"/>
-            <a:ext cx="2900560" cy="960781"/>
+            <a:off x="8992152" y="4805585"/>
+            <a:ext cx="2604565" cy="690847"/>
           </a:xfrm>
           <a:prstGeom prst="rect">
             <a:avLst/>
@@ -3628,18 +3693,7 @@
             <a:pPr algn="ctr"/>
             <a:r>
               <a:rPr lang="en-GB" dirty="0"/>
-              <a:t>example-</a:t>
-            </a:r>
-          </a:p>
-          <a:p>
-            <a:pPr algn="ctr"/>
-            <a:r>
-              <a:rPr lang="en-GB" dirty="0" err="1"/>
-              <a:t>publishmq</a:t>
-            </a:r>
-            <a:r>
-              <a:rPr lang="en-GB" dirty="0"/>
-              <a:t>-canonical</a:t>
+              <a:t>example-canonical</a:t>
             </a:r>
           </a:p>
         </p:txBody>
@@ -3658,8 +3712,8 @@
         </p:nvSpPr>
         <p:spPr>
           <a:xfrm>
-            <a:off x="6227366" y="4227586"/>
-            <a:ext cx="2900560" cy="960781"/>
+            <a:off x="5420419" y="5188413"/>
+            <a:ext cx="2604565" cy="690847"/>
           </a:xfrm>
           <a:prstGeom prst="rect">
             <a:avLst/>
@@ -3701,9 +3755,6 @@
               <a:rPr lang="en-GB" dirty="0"/>
               <a:t>example-</a:t>
             </a:r>
-          </a:p>
-          <a:p>
-            <a:pPr algn="ctr"/>
             <a:r>
               <a:rPr lang="en-GB" dirty="0" err="1"/>
               <a:t>dom</a:t>
@@ -3726,8 +3777,8 @@
         </p:nvSpPr>
         <p:spPr>
           <a:xfrm>
-            <a:off x="8515026" y="2982079"/>
-            <a:ext cx="2900560" cy="960781"/>
+            <a:off x="8992152" y="3226191"/>
+            <a:ext cx="2604565" cy="690847"/>
           </a:xfrm>
           <a:prstGeom prst="rect">
             <a:avLst/>
@@ -3769,12 +3820,9 @@
               <a:rPr lang="en-GB" dirty="0"/>
               <a:t>example-</a:t>
             </a:r>
-          </a:p>
-          <a:p>
-            <a:pPr algn="ctr"/>
             <a:r>
               <a:rPr lang="en-GB" dirty="0" err="1"/>
-              <a:t>publishmq-embeddedcamel</a:t>
+              <a:t>embeddedcamel</a:t>
             </a:r>
             <a:endParaRPr lang="en-GB" dirty="0"/>
           </a:p>
@@ -3794,8 +3842,8 @@
         </p:nvSpPr>
         <p:spPr>
           <a:xfrm>
-            <a:off x="2190425" y="4227587"/>
-            <a:ext cx="2900560" cy="960781"/>
+            <a:off x="2071888" y="4703561"/>
+            <a:ext cx="2604565" cy="690847"/>
           </a:xfrm>
           <a:prstGeom prst="rect">
             <a:avLst/>
@@ -3854,8 +3902,8 @@
         </p:nvSpPr>
         <p:spPr>
           <a:xfrm>
-            <a:off x="2190424" y="645033"/>
-            <a:ext cx="2900560" cy="960781"/>
+            <a:off x="2080520" y="1490701"/>
+            <a:ext cx="2604565" cy="690847"/>
           </a:xfrm>
           <a:prstGeom prst="rect">
             <a:avLst/>
@@ -3863,15 +3911,15 @@
         </p:spPr>
         <p:style>
           <a:lnRef idx="2">
-            <a:schemeClr val="accent5">
+            <a:schemeClr val="accent1">
               <a:shade val="50000"/>
             </a:schemeClr>
           </a:lnRef>
           <a:fillRef idx="1">
-            <a:schemeClr val="accent5"/>
+            <a:schemeClr val="accent1"/>
           </a:fillRef>
           <a:effectRef idx="0">
-            <a:schemeClr val="accent5"/>
+            <a:schemeClr val="accent1"/>
           </a:effectRef>
           <a:fontRef idx="minor">
             <a:schemeClr val="lt1"/>
@@ -3919,8 +3967,8 @@
         </p:nvCxnSpPr>
         <p:spPr>
           <a:xfrm rot="5400000">
-            <a:off x="3138711" y="2107807"/>
-            <a:ext cx="1003986" cy="12700"/>
+            <a:off x="2750601" y="2809082"/>
+            <a:ext cx="1259736" cy="4668"/>
           </a:xfrm>
           <a:prstGeom prst="curvedConnector3">
             <a:avLst>
@@ -3958,15 +4006,15 @@
           </p:cNvPr>
           <p:cNvCxnSpPr>
             <a:cxnSpLocks/>
-            <a:stCxn id="15" idx="2"/>
-            <a:endCxn id="9" idx="1"/>
+            <a:stCxn id="15" idx="3"/>
+            <a:endCxn id="9" idx="0"/>
           </p:cNvCxnSpPr>
           <p:nvPr/>
         </p:nvCxnSpPr>
         <p:spPr>
-          <a:xfrm rot="16200000" flipH="1">
-            <a:off x="5159470" y="87047"/>
-            <a:ext cx="323024" cy="3360557"/>
+          <a:xfrm>
+            <a:off x="4685085" y="1836125"/>
+            <a:ext cx="2030339" cy="601843"/>
           </a:xfrm>
           <a:prstGeom prst="curvedConnector2">
             <a:avLst/>
@@ -4009,8 +4057,8 @@
         </p:nvCxnSpPr>
         <p:spPr>
           <a:xfrm rot="5400000">
-            <a:off x="6430782" y="1069431"/>
-            <a:ext cx="680963" cy="3360557"/>
+            <a:off x="5368975" y="2440258"/>
+            <a:ext cx="657893" cy="2035007"/>
           </a:xfrm>
           <a:prstGeom prst="curvedConnector2">
             <a:avLst/>
@@ -4053,8 +4101,8 @@
         </p:nvCxnSpPr>
         <p:spPr>
           <a:xfrm rot="5400000">
-            <a:off x="9196232" y="4711934"/>
-            <a:ext cx="1538149" cy="12700"/>
+            <a:off x="9850162" y="4361311"/>
+            <a:ext cx="888547" cy="12700"/>
           </a:xfrm>
           <a:prstGeom prst="curvedConnector3">
             <a:avLst>
@@ -4098,9 +4146,9 @@
           <p:nvPr/>
         </p:nvCxnSpPr>
         <p:spPr>
-          <a:xfrm rot="5400000">
-            <a:off x="7155415" y="2931460"/>
-            <a:ext cx="1818358" cy="773895"/>
+          <a:xfrm rot="16200000" flipH="1">
+            <a:off x="5689264" y="4154975"/>
+            <a:ext cx="2059598" cy="7278"/>
           </a:xfrm>
           <a:prstGeom prst="curvedConnector3">
             <a:avLst>
@@ -4139,19 +4187,17 @@
           <p:cNvCxnSpPr>
             <a:cxnSpLocks/>
             <a:stCxn id="9" idx="2"/>
-            <a:endCxn id="12" idx="0"/>
+            <a:endCxn id="12" idx="1"/>
           </p:cNvCxnSpPr>
           <p:nvPr/>
         </p:nvCxnSpPr>
         <p:spPr>
           <a:xfrm rot="16200000" flipH="1">
-            <a:off x="8921998" y="1938770"/>
-            <a:ext cx="572851" cy="1513765"/>
-          </a:xfrm>
-          <a:prstGeom prst="curvedConnector3">
-            <a:avLst>
-              <a:gd name="adj1" fmla="val 50000"/>
-            </a:avLst>
+            <a:off x="7632388" y="2211851"/>
+            <a:ext cx="442800" cy="2276728"/>
+          </a:xfrm>
+          <a:prstGeom prst="curvedConnector2">
+            <a:avLst/>
           </a:prstGeom>
           <a:ln>
             <a:prstDash val="dash"/>
@@ -4190,9 +4236,9 @@
           <p:nvPr/>
         </p:nvCxnSpPr>
         <p:spPr>
-          <a:xfrm rot="16200000" flipH="1">
-            <a:off x="3312201" y="3899083"/>
-            <a:ext cx="657006" cy="1"/>
+          <a:xfrm rot="5400000">
+            <a:off x="3090438" y="4415864"/>
+            <a:ext cx="571430" cy="3964"/>
           </a:xfrm>
           <a:prstGeom prst="curvedConnector3">
             <a:avLst>
@@ -4233,8 +4279,8 @@
         </p:nvSpPr>
         <p:spPr>
           <a:xfrm>
-            <a:off x="102290" y="3792066"/>
-            <a:ext cx="1253582" cy="515181"/>
+            <a:off x="153696" y="3566657"/>
+            <a:ext cx="1080000" cy="411103"/>
           </a:xfrm>
           <a:prstGeom prst="rect">
             <a:avLst/>
@@ -4260,21 +4306,21 @@
           <a:p>
             <a:pPr algn="ctr"/>
             <a:r>
-              <a:rPr lang="en-GB" dirty="0"/>
+              <a:rPr lang="en-GB" sz="1400" dirty="0"/>
               <a:t>parent</a:t>
             </a:r>
           </a:p>
           <a:p>
             <a:pPr algn="ctr"/>
             <a:r>
-              <a:rPr lang="en-GB" dirty="0"/>
+              <a:rPr lang="en-GB" sz="1400" dirty="0"/>
               <a:t>.</a:t>
             </a:r>
             <a:r>
-              <a:rPr lang="en-GB" dirty="0" err="1"/>
+              <a:rPr lang="en-GB" sz="1400" dirty="0" err="1"/>
               <a:t>pom</a:t>
             </a:r>
-            <a:endParaRPr lang="en-GB" dirty="0"/>
+            <a:endParaRPr lang="en-GB" sz="1400" dirty="0"/>
           </a:p>
         </p:txBody>
       </p:sp>
@@ -4292,8 +4338,8 @@
         </p:nvSpPr>
         <p:spPr>
           <a:xfrm>
-            <a:off x="102289" y="4391221"/>
-            <a:ext cx="1253583" cy="529137"/>
+            <a:off x="153695" y="4086023"/>
+            <a:ext cx="1080000" cy="422240"/>
           </a:xfrm>
           <a:prstGeom prst="rect">
             <a:avLst/>
@@ -4321,14 +4367,14 @@
           <a:p>
             <a:pPr algn="ctr"/>
             <a:r>
-              <a:rPr lang="en-GB" dirty="0" err="1"/>
+              <a:rPr lang="en-GB" sz="1400" dirty="0" err="1"/>
               <a:t>webapp</a:t>
             </a:r>
             <a:br>
-              <a:rPr lang="en-GB" dirty="0"/>
+              <a:rPr lang="en-GB" sz="1400" dirty="0"/>
             </a:br>
             <a:r>
-              <a:rPr lang="en-GB" dirty="0"/>
+              <a:rPr lang="en-GB" sz="1400" dirty="0"/>
               <a:t>.war</a:t>
             </a:r>
           </a:p>
@@ -4348,8 +4394,8 @@
         </p:nvSpPr>
         <p:spPr>
           <a:xfrm>
-            <a:off x="102289" y="5004332"/>
-            <a:ext cx="1242249" cy="480033"/>
+            <a:off x="153695" y="4616526"/>
+            <a:ext cx="1080000" cy="383056"/>
           </a:xfrm>
           <a:prstGeom prst="rect">
             <a:avLst/>
@@ -4377,19 +4423,19 @@
           <a:p>
             <a:pPr algn="ctr"/>
             <a:r>
-              <a:rPr lang="en-GB" dirty="0"/>
+              <a:rPr lang="en-GB" sz="1400" dirty="0"/>
               <a:t>app </a:t>
             </a:r>
             <a:r>
-              <a:rPr lang="en-GB" dirty="0" err="1"/>
+              <a:rPr lang="en-GB" sz="1400" dirty="0" err="1"/>
               <a:t>defn</a:t>
             </a:r>
-            <a:endParaRPr lang="en-GB" dirty="0"/>
+            <a:endParaRPr lang="en-GB" sz="1400" dirty="0"/>
           </a:p>
           <a:p>
             <a:pPr algn="ctr"/>
             <a:r>
-              <a:rPr lang="en-GB" dirty="0"/>
+              <a:rPr lang="en-GB" sz="1400" dirty="0"/>
               <a:t>.jar</a:t>
             </a:r>
           </a:p>
@@ -4409,8 +4455,8 @@
         </p:nvSpPr>
         <p:spPr>
           <a:xfrm>
-            <a:off x="102290" y="5568339"/>
-            <a:ext cx="1242249" cy="500996"/>
+            <a:off x="153695" y="5107845"/>
+            <a:ext cx="1080000" cy="399784"/>
           </a:xfrm>
           <a:prstGeom prst="rect">
             <a:avLst/>
@@ -4438,19 +4484,19 @@
           <a:p>
             <a:pPr algn="ctr"/>
             <a:r>
-              <a:rPr lang="en-GB" dirty="0"/>
+              <a:rPr lang="en-GB" sz="1400" dirty="0"/>
               <a:t>.</a:t>
             </a:r>
             <a:r>
-              <a:rPr lang="en-GB" dirty="0" err="1"/>
+              <a:rPr lang="en-GB" sz="1400" dirty="0" err="1"/>
               <a:t>dom</a:t>
             </a:r>
-            <a:endParaRPr lang="en-GB" dirty="0"/>
+            <a:endParaRPr lang="en-GB" sz="1400" dirty="0"/>
           </a:p>
           <a:p>
             <a:pPr algn="ctr"/>
             <a:r>
-              <a:rPr lang="en-GB" dirty="0"/>
+              <a:rPr lang="en-GB" sz="1400" dirty="0"/>
               <a:t>.jar</a:t>
             </a:r>
           </a:p>
@@ -4470,8 +4516,8 @@
         </p:nvSpPr>
         <p:spPr>
           <a:xfrm>
-            <a:off x="102290" y="6153308"/>
-            <a:ext cx="1242249" cy="506983"/>
+            <a:off x="153695" y="6146397"/>
+            <a:ext cx="1080000" cy="404561"/>
           </a:xfrm>
           <a:prstGeom prst="rect">
             <a:avLst/>
@@ -4499,18 +4545,18 @@
           <a:p>
             <a:pPr algn="ctr"/>
             <a:r>
-              <a:rPr lang="en-GB" dirty="0"/>
+              <a:rPr lang="en-GB" sz="1400" dirty="0"/>
               <a:t>camel/</a:t>
             </a:r>
             <a:r>
-              <a:rPr lang="en-GB" dirty="0" err="1"/>
+              <a:rPr lang="en-GB" sz="1400" dirty="0" err="1"/>
               <a:t>dto</a:t>
             </a:r>
             <a:br>
-              <a:rPr lang="en-GB" dirty="0"/>
+              <a:rPr lang="en-GB" sz="1400" dirty="0"/>
             </a:br>
             <a:r>
-              <a:rPr lang="en-GB" dirty="0"/>
+              <a:rPr lang="en-GB" sz="1400" dirty="0"/>
               <a:t>.jar</a:t>
             </a:r>
           </a:p>
@@ -4518,10 +4564,10 @@
       </p:sp>
       <p:sp>
         <p:nvSpPr>
-          <p:cNvPr id="61" name="TextBox 60">
-            <a:extLst>
-              <a:ext uri="{FF2B5EF4-FFF2-40B4-BE49-F238E27FC236}">
-                <a16:creationId xmlns:a16="http://schemas.microsoft.com/office/drawing/2014/main" id="{5AAFA11D-2E2C-428E-9FA5-3C927E7A71C1}"/>
+          <p:cNvPr id="66" name="TextBox 65">
+            <a:extLst>
+              <a:ext uri="{FF2B5EF4-FFF2-40B4-BE49-F238E27FC236}">
+                <a16:creationId xmlns:a16="http://schemas.microsoft.com/office/drawing/2014/main" id="{DC55C7B9-8370-4BA5-8D4E-4632D29BB355}"/>
               </a:ext>
             </a:extLst>
           </p:cNvPr>
@@ -4530,8 +4576,8 @@
         </p:nvSpPr>
         <p:spPr>
           <a:xfrm>
-            <a:off x="4828944" y="1892204"/>
-            <a:ext cx="1105367" cy="369332"/>
+            <a:off x="5195215" y="3378385"/>
+            <a:ext cx="899092" cy="307777"/>
           </a:xfrm>
           <a:prstGeom prst="rect">
             <a:avLst/>
@@ -4545,18 +4591,18 @@
           <a:lstStyle/>
           <a:p>
             <a:r>
-              <a:rPr lang="en-GB" dirty="0"/>
-              <a:t>[optional]</a:t>
-            </a:r>
-          </a:p>
-        </p:txBody>
-      </p:sp>
-      <p:sp>
-        <p:nvSpPr>
-          <p:cNvPr id="66" name="TextBox 65">
-            <a:extLst>
-              <a:ext uri="{FF2B5EF4-FFF2-40B4-BE49-F238E27FC236}">
-                <a16:creationId xmlns:a16="http://schemas.microsoft.com/office/drawing/2014/main" id="{DC55C7B9-8370-4BA5-8D4E-4632D29BB355}"/>
+              <a:rPr lang="en-GB" sz="1400" dirty="0"/>
+              <a:t>“extends”</a:t>
+            </a:r>
+          </a:p>
+        </p:txBody>
+      </p:sp>
+      <p:sp>
+        <p:nvSpPr>
+          <p:cNvPr id="95" name="TextBox 94">
+            <a:extLst>
+              <a:ext uri="{FF2B5EF4-FFF2-40B4-BE49-F238E27FC236}">
+                <a16:creationId xmlns:a16="http://schemas.microsoft.com/office/drawing/2014/main" id="{946AB88C-9410-4E16-910D-9E11D567DD57}"/>
               </a:ext>
             </a:extLst>
           </p:cNvPr>
@@ -4565,8 +4611,8 @@
         </p:nvSpPr>
         <p:spPr>
           <a:xfrm>
-            <a:off x="6081266" y="2973087"/>
-            <a:ext cx="919995" cy="369332"/>
+            <a:off x="92350" y="2280410"/>
+            <a:ext cx="492827" cy="307777"/>
           </a:xfrm>
           <a:prstGeom prst="rect">
             <a:avLst/>
@@ -4580,35 +4626,97 @@
           <a:lstStyle/>
           <a:p>
             <a:r>
+              <a:rPr lang="en-GB" sz="1400" i="1" dirty="0"/>
+              <a:t>Key:</a:t>
+            </a:r>
+          </a:p>
+        </p:txBody>
+      </p:sp>
+      <p:sp>
+        <p:nvSpPr>
+          <p:cNvPr id="27" name="Rectangle 26">
+            <a:extLst>
+              <a:ext uri="{FF2B5EF4-FFF2-40B4-BE49-F238E27FC236}">
+                <a16:creationId xmlns:a16="http://schemas.microsoft.com/office/drawing/2014/main" id="{AAC83E29-BD97-4EEC-9AB8-EF2C15FBAF0B}"/>
+              </a:ext>
+            </a:extLst>
+          </p:cNvPr>
+          <p:cNvSpPr/>
+          <p:nvPr/>
+        </p:nvSpPr>
+        <p:spPr>
+          <a:xfrm>
+            <a:off x="2054867" y="5965838"/>
+            <a:ext cx="2604565" cy="690847"/>
+          </a:xfrm>
+          <a:prstGeom prst="rect">
+            <a:avLst/>
+          </a:prstGeom>
+        </p:spPr>
+        <p:style>
+          <a:lnRef idx="2">
+            <a:schemeClr val="accent5">
+              <a:shade val="50000"/>
+            </a:schemeClr>
+          </a:lnRef>
+          <a:fillRef idx="1">
+            <a:schemeClr val="accent5"/>
+          </a:fillRef>
+          <a:effectRef idx="0">
+            <a:schemeClr val="accent5"/>
+          </a:effectRef>
+          <a:fontRef idx="minor">
+            <a:schemeClr val="lt1"/>
+          </a:fontRef>
+        </p:style>
+        <p:txBody>
+          <a:bodyPr rtlCol="0" anchor="ctr"/>
+          <a:lstStyle/>
+          <a:p>
+            <a:pPr algn="ctr"/>
+            <a:r>
+              <a:rPr lang="en-GB" dirty="0" err="1"/>
+              <a:t>incode-domainapp</a:t>
+            </a:r>
+            <a:r>
               <a:rPr lang="en-GB" dirty="0"/>
-              <a:t>extends</a:t>
+              <a:t>-</a:t>
+            </a:r>
+          </a:p>
+          <a:p>
+            <a:pPr algn="ctr"/>
+            <a:r>
+              <a:rPr lang="en-GB" dirty="0"/>
+              <a:t>module-base</a:t>
             </a:r>
           </a:p>
         </p:txBody>
       </p:sp>
       <p:cxnSp>
         <p:nvCxnSpPr>
-          <p:cNvPr id="85" name="Connector: Curved 84">
-            <a:extLst>
-              <a:ext uri="{FF2B5EF4-FFF2-40B4-BE49-F238E27FC236}">
-                <a16:creationId xmlns:a16="http://schemas.microsoft.com/office/drawing/2014/main" id="{7F9DCC4F-CE2C-46EF-8B36-DEFA3FE00B17}"/>
+          <p:cNvPr id="28" name="Connector: Curved 27">
+            <a:extLst>
+              <a:ext uri="{FF2B5EF4-FFF2-40B4-BE49-F238E27FC236}">
+                <a16:creationId xmlns:a16="http://schemas.microsoft.com/office/drawing/2014/main" id="{007CFC32-577B-44FD-9292-FCE2548F3D68}"/>
               </a:ext>
             </a:extLst>
           </p:cNvPr>
           <p:cNvCxnSpPr>
             <a:cxnSpLocks/>
-            <a:stCxn id="11" idx="2"/>
-            <a:endCxn id="10" idx="1"/>
+            <a:stCxn id="14" idx="2"/>
+            <a:endCxn id="27" idx="0"/>
           </p:cNvCxnSpPr>
           <p:nvPr/>
         </p:nvCxnSpPr>
         <p:spPr>
-          <a:xfrm rot="16200000" flipH="1">
-            <a:off x="7709820" y="5156193"/>
-            <a:ext cx="773033" cy="837380"/>
-          </a:xfrm>
-          <a:prstGeom prst="curvedConnector2">
-            <a:avLst/>
+          <a:xfrm rot="5400000">
+            <a:off x="3079946" y="5671613"/>
+            <a:ext cx="571430" cy="17021"/>
+          </a:xfrm>
+          <a:prstGeom prst="curvedConnector3">
+            <a:avLst>
+              <a:gd name="adj1" fmla="val 50000"/>
+            </a:avLst>
           </a:prstGeom>
           <a:ln>
             <a:prstDash val="dash"/>
@@ -4630,12 +4738,160 @@
           </a:fontRef>
         </p:style>
       </p:cxnSp>
-      <p:sp>
-        <p:nvSpPr>
-          <p:cNvPr id="95" name="TextBox 94">
-            <a:extLst>
-              <a:ext uri="{FF2B5EF4-FFF2-40B4-BE49-F238E27FC236}">
-                <a16:creationId xmlns:a16="http://schemas.microsoft.com/office/drawing/2014/main" id="{946AB88C-9410-4E16-910D-9E11D567DD57}"/>
+      <p:cxnSp>
+        <p:nvCxnSpPr>
+          <p:cNvPr id="32" name="Connector: Curved 31">
+            <a:extLst>
+              <a:ext uri="{FF2B5EF4-FFF2-40B4-BE49-F238E27FC236}">
+                <a16:creationId xmlns:a16="http://schemas.microsoft.com/office/drawing/2014/main" id="{49133326-9AF8-4286-8C9B-2EB5BA79270C}"/>
+              </a:ext>
+            </a:extLst>
+          </p:cNvPr>
+          <p:cNvCxnSpPr>
+            <a:cxnSpLocks/>
+            <a:stCxn id="11" idx="2"/>
+            <a:endCxn id="27" idx="3"/>
+          </p:cNvCxnSpPr>
+          <p:nvPr/>
+        </p:nvCxnSpPr>
+        <p:spPr>
+          <a:xfrm rot="5400000">
+            <a:off x="5475066" y="5063626"/>
+            <a:ext cx="432002" cy="2063270"/>
+          </a:xfrm>
+          <a:prstGeom prst="curvedConnector2">
+            <a:avLst/>
+          </a:prstGeom>
+          <a:ln>
+            <a:prstDash val="dash"/>
+            <a:tailEnd type="arrow" w="lg" len="lg"/>
+          </a:ln>
+        </p:spPr>
+        <p:style>
+          <a:lnRef idx="1">
+            <a:schemeClr val="accent1"/>
+          </a:lnRef>
+          <a:fillRef idx="0">
+            <a:schemeClr val="accent1"/>
+          </a:fillRef>
+          <a:effectRef idx="0">
+            <a:schemeClr val="accent1"/>
+          </a:effectRef>
+          <a:fontRef idx="minor">
+            <a:schemeClr val="tx1"/>
+          </a:fontRef>
+        </p:style>
+      </p:cxnSp>
+      <p:sp>
+        <p:nvSpPr>
+          <p:cNvPr id="35" name="Rectangle 34">
+            <a:extLst>
+              <a:ext uri="{FF2B5EF4-FFF2-40B4-BE49-F238E27FC236}">
+                <a16:creationId xmlns:a16="http://schemas.microsoft.com/office/drawing/2014/main" id="{F054E78D-5EDF-4692-8237-C86FD5FFFDF3}"/>
+              </a:ext>
+            </a:extLst>
+          </p:cNvPr>
+          <p:cNvSpPr/>
+          <p:nvPr/>
+        </p:nvSpPr>
+        <p:spPr>
+          <a:xfrm>
+            <a:off x="153695" y="5615892"/>
+            <a:ext cx="1080000" cy="422240"/>
+          </a:xfrm>
+          <a:prstGeom prst="rect">
+            <a:avLst/>
+          </a:prstGeom>
+        </p:spPr>
+        <p:style>
+          <a:lnRef idx="2">
+            <a:schemeClr val="accent5">
+              <a:shade val="50000"/>
+            </a:schemeClr>
+          </a:lnRef>
+          <a:fillRef idx="1">
+            <a:schemeClr val="accent5"/>
+          </a:fillRef>
+          <a:effectRef idx="0">
+            <a:schemeClr val="accent5"/>
+          </a:effectRef>
+          <a:fontRef idx="minor">
+            <a:schemeClr val="lt1"/>
+          </a:fontRef>
+        </p:style>
+        <p:txBody>
+          <a:bodyPr rtlCol="0" anchor="ctr"/>
+          <a:lstStyle/>
+          <a:p>
+            <a:pPr algn="ctr"/>
+            <a:r>
+              <a:rPr lang="en-GB" sz="1400" dirty="0"/>
+              <a:t>base </a:t>
+            </a:r>
+            <a:r>
+              <a:rPr lang="en-GB" sz="1400" dirty="0" err="1"/>
+              <a:t>utils</a:t>
+            </a:r>
+            <a:br>
+              <a:rPr lang="en-GB" sz="1400" dirty="0"/>
+            </a:br>
+            <a:r>
+              <a:rPr lang="en-GB" sz="1400" dirty="0"/>
+              <a:t>.jar</a:t>
+            </a:r>
+          </a:p>
+        </p:txBody>
+      </p:sp>
+      <p:cxnSp>
+        <p:nvCxnSpPr>
+          <p:cNvPr id="36" name="Connector: Curved 35">
+            <a:extLst>
+              <a:ext uri="{FF2B5EF4-FFF2-40B4-BE49-F238E27FC236}">
+                <a16:creationId xmlns:a16="http://schemas.microsoft.com/office/drawing/2014/main" id="{B7BC151F-D659-417F-A783-51938BE4BEA8}"/>
+              </a:ext>
+            </a:extLst>
+          </p:cNvPr>
+          <p:cNvCxnSpPr>
+            <a:cxnSpLocks/>
+          </p:cNvCxnSpPr>
+          <p:nvPr/>
+        </p:nvCxnSpPr>
+        <p:spPr>
+          <a:xfrm rot="10800000">
+            <a:off x="125522" y="3326291"/>
+            <a:ext cx="396230" cy="6788"/>
+          </a:xfrm>
+          <a:prstGeom prst="curvedConnector3">
+            <a:avLst>
+              <a:gd name="adj1" fmla="val 50000"/>
+            </a:avLst>
+          </a:prstGeom>
+          <a:ln>
+            <a:prstDash val="dash"/>
+            <a:tailEnd type="arrow" w="lg" len="lg"/>
+          </a:ln>
+        </p:spPr>
+        <p:style>
+          <a:lnRef idx="1">
+            <a:schemeClr val="accent1"/>
+          </a:lnRef>
+          <a:fillRef idx="0">
+            <a:schemeClr val="accent1"/>
+          </a:fillRef>
+          <a:effectRef idx="0">
+            <a:schemeClr val="accent1"/>
+          </a:effectRef>
+          <a:fontRef idx="minor">
+            <a:schemeClr val="tx1"/>
+          </a:fontRef>
+        </p:style>
+      </p:cxnSp>
+      <p:sp>
+        <p:nvSpPr>
+          <p:cNvPr id="40" name="TextBox 39">
+            <a:extLst>
+              <a:ext uri="{FF2B5EF4-FFF2-40B4-BE49-F238E27FC236}">
+                <a16:creationId xmlns:a16="http://schemas.microsoft.com/office/drawing/2014/main" id="{8104B7EB-F2A1-4398-B999-ECC472E7BCF3}"/>
               </a:ext>
             </a:extLst>
           </p:cNvPr>
@@ -4644,8 +4900,8 @@
         </p:nvSpPr>
         <p:spPr>
           <a:xfrm>
-            <a:off x="61785" y="3391845"/>
-            <a:ext cx="581378" cy="369332"/>
+            <a:off x="552592" y="3056824"/>
+            <a:ext cx="1083951" cy="523220"/>
           </a:xfrm>
           <a:prstGeom prst="rect">
             <a:avLst/>
@@ -4659,8 +4915,444 @@
           <a:lstStyle/>
           <a:p>
             <a:r>
+              <a:rPr lang="en-GB" sz="1400" dirty="0"/>
+              <a:t>maven</a:t>
+            </a:r>
+            <a:br>
+              <a:rPr lang="en-GB" sz="1400" dirty="0"/>
+            </a:br>
+            <a:r>
+              <a:rPr lang="en-GB" sz="1400" dirty="0"/>
+              <a:t>dependency</a:t>
+            </a:r>
+          </a:p>
+        </p:txBody>
+      </p:sp>
+      <p:sp>
+        <p:nvSpPr>
+          <p:cNvPr id="17" name="Flowchart: Document 16">
+            <a:extLst>
+              <a:ext uri="{FF2B5EF4-FFF2-40B4-BE49-F238E27FC236}">
+                <a16:creationId xmlns:a16="http://schemas.microsoft.com/office/drawing/2014/main" id="{1BF166FF-B4DB-41E3-9A74-DC0DAC98390D}"/>
+              </a:ext>
+            </a:extLst>
+          </p:cNvPr>
+          <p:cNvSpPr/>
+          <p:nvPr/>
+        </p:nvSpPr>
+        <p:spPr>
+          <a:xfrm>
+            <a:off x="6170006" y="87754"/>
+            <a:ext cx="1105390" cy="760209"/>
+          </a:xfrm>
+          <a:prstGeom prst="flowChartDocument">
+            <a:avLst/>
+          </a:prstGeom>
+        </p:spPr>
+        <p:style>
+          <a:lnRef idx="2">
+            <a:schemeClr val="accent1"/>
+          </a:lnRef>
+          <a:fillRef idx="1">
+            <a:schemeClr val="lt1"/>
+          </a:fillRef>
+          <a:effectRef idx="0">
+            <a:schemeClr val="accent1"/>
+          </a:effectRef>
+          <a:fontRef idx="minor">
+            <a:schemeClr val="dk1"/>
+          </a:fontRef>
+        </p:style>
+        <p:txBody>
+          <a:bodyPr rtlCol="0" anchor="ctr"/>
+          <a:lstStyle/>
+          <a:p>
+            <a:pPr algn="ctr"/>
+            <a:r>
               <a:rPr lang="en-GB" dirty="0"/>
-              <a:t>Key:</a:t>
+              <a:t>web.xml</a:t>
+            </a:r>
+          </a:p>
+        </p:txBody>
+      </p:sp>
+      <p:cxnSp>
+        <p:nvCxnSpPr>
+          <p:cNvPr id="42" name="Connector: Curved 41">
+            <a:extLst>
+              <a:ext uri="{FF2B5EF4-FFF2-40B4-BE49-F238E27FC236}">
+                <a16:creationId xmlns:a16="http://schemas.microsoft.com/office/drawing/2014/main" id="{71DA3FF6-075C-4197-9416-C83BC0D386E8}"/>
+              </a:ext>
+            </a:extLst>
+          </p:cNvPr>
+          <p:cNvCxnSpPr>
+            <a:cxnSpLocks/>
+            <a:stCxn id="17" idx="1"/>
+            <a:endCxn id="16" idx="0"/>
+          </p:cNvCxnSpPr>
+          <p:nvPr/>
+        </p:nvCxnSpPr>
+        <p:spPr>
+          <a:xfrm rot="10800000" flipV="1">
+            <a:off x="3382804" y="467859"/>
+            <a:ext cx="2787202" cy="538150"/>
+          </a:xfrm>
+          <a:prstGeom prst="curvedConnector2">
+            <a:avLst/>
+          </a:prstGeom>
+          <a:ln>
+            <a:prstDash val="lgDashDot"/>
+            <a:tailEnd type="arrow" w="lg" len="lg"/>
+          </a:ln>
+        </p:spPr>
+        <p:style>
+          <a:lnRef idx="1">
+            <a:schemeClr val="accent1"/>
+          </a:lnRef>
+          <a:fillRef idx="0">
+            <a:schemeClr val="accent1"/>
+          </a:fillRef>
+          <a:effectRef idx="0">
+            <a:schemeClr val="accent1"/>
+          </a:effectRef>
+          <a:fontRef idx="minor">
+            <a:schemeClr val="tx1"/>
+          </a:fontRef>
+        </p:style>
+      </p:cxnSp>
+      <p:cxnSp>
+        <p:nvCxnSpPr>
+          <p:cNvPr id="73" name="Connector: Curved 72">
+            <a:extLst>
+              <a:ext uri="{FF2B5EF4-FFF2-40B4-BE49-F238E27FC236}">
+                <a16:creationId xmlns:a16="http://schemas.microsoft.com/office/drawing/2014/main" id="{BDCFE337-ECA9-4F4B-894B-5B9210753B6A}"/>
+              </a:ext>
+            </a:extLst>
+          </p:cNvPr>
+          <p:cNvCxnSpPr>
+            <a:cxnSpLocks/>
+            <a:stCxn id="17" idx="3"/>
+            <a:endCxn id="112" idx="0"/>
+          </p:cNvCxnSpPr>
+          <p:nvPr/>
+        </p:nvCxnSpPr>
+        <p:spPr>
+          <a:xfrm>
+            <a:off x="7275396" y="467859"/>
+            <a:ext cx="2959597" cy="1022843"/>
+          </a:xfrm>
+          <a:prstGeom prst="curvedConnector2">
+            <a:avLst/>
+          </a:prstGeom>
+          <a:ln>
+            <a:prstDash val="lgDashDot"/>
+            <a:tailEnd type="arrow" w="lg" len="lg"/>
+          </a:ln>
+        </p:spPr>
+        <p:style>
+          <a:lnRef idx="1">
+            <a:schemeClr val="accent1"/>
+          </a:lnRef>
+          <a:fillRef idx="0">
+            <a:schemeClr val="accent1"/>
+          </a:fillRef>
+          <a:effectRef idx="0">
+            <a:schemeClr val="accent1"/>
+          </a:effectRef>
+          <a:fontRef idx="minor">
+            <a:schemeClr val="tx1"/>
+          </a:fontRef>
+        </p:style>
+      </p:cxnSp>
+      <p:cxnSp>
+        <p:nvCxnSpPr>
+          <p:cNvPr id="81" name="Connector: Curved 80">
+            <a:extLst>
+              <a:ext uri="{FF2B5EF4-FFF2-40B4-BE49-F238E27FC236}">
+                <a16:creationId xmlns:a16="http://schemas.microsoft.com/office/drawing/2014/main" id="{E0DBBBB3-E178-4C40-9E51-8AC6789AE499}"/>
+              </a:ext>
+            </a:extLst>
+          </p:cNvPr>
+          <p:cNvCxnSpPr>
+            <a:cxnSpLocks/>
+          </p:cNvCxnSpPr>
+          <p:nvPr/>
+        </p:nvCxnSpPr>
+        <p:spPr>
+          <a:xfrm rot="10800000">
+            <a:off x="156772" y="2895238"/>
+            <a:ext cx="396230" cy="6788"/>
+          </a:xfrm>
+          <a:prstGeom prst="curvedConnector3">
+            <a:avLst>
+              <a:gd name="adj1" fmla="val 81186"/>
+            </a:avLst>
+          </a:prstGeom>
+          <a:ln>
+            <a:prstDash val="lgDashDot"/>
+            <a:tailEnd type="arrow" w="lg" len="lg"/>
+          </a:ln>
+        </p:spPr>
+        <p:style>
+          <a:lnRef idx="1">
+            <a:schemeClr val="accent1"/>
+          </a:lnRef>
+          <a:fillRef idx="0">
+            <a:schemeClr val="accent1"/>
+          </a:fillRef>
+          <a:effectRef idx="0">
+            <a:schemeClr val="accent1"/>
+          </a:effectRef>
+          <a:fontRef idx="minor">
+            <a:schemeClr val="tx1"/>
+          </a:fontRef>
+        </p:style>
+      </p:cxnSp>
+      <p:sp>
+        <p:nvSpPr>
+          <p:cNvPr id="83" name="TextBox 82">
+            <a:extLst>
+              <a:ext uri="{FF2B5EF4-FFF2-40B4-BE49-F238E27FC236}">
+                <a16:creationId xmlns:a16="http://schemas.microsoft.com/office/drawing/2014/main" id="{5F7004B3-D2B5-41DE-9626-D8782E719A5C}"/>
+              </a:ext>
+            </a:extLst>
+          </p:cNvPr>
+          <p:cNvSpPr txBox="1"/>
+          <p:nvPr/>
+        </p:nvSpPr>
+        <p:spPr>
+          <a:xfrm>
+            <a:off x="556708" y="2591378"/>
+            <a:ext cx="1008096" cy="523220"/>
+          </a:xfrm>
+          <a:prstGeom prst="rect">
+            <a:avLst/>
+          </a:prstGeom>
+          <a:noFill/>
+        </p:spPr>
+        <p:txBody>
+          <a:bodyPr wrap="none" rtlCol="0">
+            <a:spAutoFit/>
+          </a:bodyPr>
+          <a:lstStyle/>
+          <a:p>
+            <a:r>
+              <a:rPr lang="en-GB" sz="1400" dirty="0"/>
+              <a:t>web.xml</a:t>
+            </a:r>
+            <a:br>
+              <a:rPr lang="en-GB" sz="1400" dirty="0"/>
+            </a:br>
+            <a:r>
+              <a:rPr lang="en-GB" sz="1400" dirty="0"/>
+              <a:t>declaration</a:t>
+            </a:r>
+          </a:p>
+        </p:txBody>
+      </p:sp>
+      <p:sp>
+        <p:nvSpPr>
+          <p:cNvPr id="84" name="TextBox 83">
+            <a:extLst>
+              <a:ext uri="{FF2B5EF4-FFF2-40B4-BE49-F238E27FC236}">
+                <a16:creationId xmlns:a16="http://schemas.microsoft.com/office/drawing/2014/main" id="{46342F55-5205-4C6F-81BD-4A1BFFAFE65C}"/>
+              </a:ext>
+            </a:extLst>
+          </p:cNvPr>
+          <p:cNvSpPr txBox="1"/>
+          <p:nvPr/>
+        </p:nvSpPr>
+        <p:spPr>
+          <a:xfrm>
+            <a:off x="2717586" y="218897"/>
+            <a:ext cx="1824410" cy="307777"/>
+          </a:xfrm>
+          <a:prstGeom prst="rect">
+            <a:avLst/>
+          </a:prstGeom>
+          <a:noFill/>
+        </p:spPr>
+        <p:txBody>
+          <a:bodyPr wrap="none" rtlCol="0">
+            <a:spAutoFit/>
+          </a:bodyPr>
+          <a:lstStyle/>
+          <a:p>
+            <a:r>
+              <a:rPr lang="en-GB" sz="1400" dirty="0"/>
+              <a:t>Bootstraps Apache Isis</a:t>
+            </a:r>
+          </a:p>
+        </p:txBody>
+      </p:sp>
+      <p:sp>
+        <p:nvSpPr>
+          <p:cNvPr id="86" name="TextBox 85">
+            <a:extLst>
+              <a:ext uri="{FF2B5EF4-FFF2-40B4-BE49-F238E27FC236}">
+                <a16:creationId xmlns:a16="http://schemas.microsoft.com/office/drawing/2014/main" id="{3F73D5FF-B89C-4BF6-9D26-63687EA8AE9D}"/>
+              </a:ext>
+            </a:extLst>
+          </p:cNvPr>
+          <p:cNvSpPr txBox="1"/>
+          <p:nvPr/>
+        </p:nvSpPr>
+        <p:spPr>
+          <a:xfrm>
+            <a:off x="9395858" y="230809"/>
+            <a:ext cx="2297296" cy="523220"/>
+          </a:xfrm>
+          <a:prstGeom prst="rect">
+            <a:avLst/>
+          </a:prstGeom>
+          <a:noFill/>
+        </p:spPr>
+        <p:txBody>
+          <a:bodyPr wrap="none" rtlCol="0">
+            <a:spAutoFit/>
+          </a:bodyPr>
+          <a:lstStyle/>
+          <a:p>
+            <a:r>
+              <a:rPr lang="en-GB" sz="1400" dirty="0"/>
+              <a:t>Bootstraps Embedded Camel</a:t>
+            </a:r>
+            <a:br>
+              <a:rPr lang="en-GB" sz="1400" dirty="0"/>
+            </a:br>
+            <a:r>
+              <a:rPr lang="en-GB" sz="1400" dirty="0"/>
+              <a:t>(+ Spring + </a:t>
+            </a:r>
+            <a:r>
+              <a:rPr lang="en-GB" sz="1400" dirty="0" err="1"/>
+              <a:t>ActiveMQ</a:t>
+            </a:r>
+            <a:r>
+              <a:rPr lang="en-GB" sz="1400" dirty="0"/>
+              <a:t>)</a:t>
+            </a:r>
+          </a:p>
+        </p:txBody>
+      </p:sp>
+      <p:cxnSp>
+        <p:nvCxnSpPr>
+          <p:cNvPr id="41" name="Connector: Curved 40">
+            <a:extLst>
+              <a:ext uri="{FF2B5EF4-FFF2-40B4-BE49-F238E27FC236}">
+                <a16:creationId xmlns:a16="http://schemas.microsoft.com/office/drawing/2014/main" id="{69136D57-9160-416D-B3F9-878F1C369BCD}"/>
+              </a:ext>
+            </a:extLst>
+          </p:cNvPr>
+          <p:cNvCxnSpPr>
+            <a:cxnSpLocks/>
+            <a:stCxn id="12" idx="2"/>
+            <a:endCxn id="14" idx="3"/>
+          </p:cNvCxnSpPr>
+          <p:nvPr/>
+        </p:nvCxnSpPr>
+        <p:spPr>
+          <a:xfrm rot="5400000">
+            <a:off x="6919471" y="1674020"/>
+            <a:ext cx="1131947" cy="5617982"/>
+          </a:xfrm>
+          <a:prstGeom prst="curvedConnector2">
+            <a:avLst/>
+          </a:prstGeom>
+          <a:ln>
+            <a:prstDash val="dash"/>
+            <a:tailEnd type="arrow" w="lg" len="lg"/>
+          </a:ln>
+        </p:spPr>
+        <p:style>
+          <a:lnRef idx="1">
+            <a:schemeClr val="accent1"/>
+          </a:lnRef>
+          <a:fillRef idx="0">
+            <a:schemeClr val="accent1"/>
+          </a:fillRef>
+          <a:effectRef idx="0">
+            <a:schemeClr val="accent1"/>
+          </a:effectRef>
+          <a:fontRef idx="minor">
+            <a:schemeClr val="tx1"/>
+          </a:fontRef>
+        </p:style>
+      </p:cxnSp>
+      <p:cxnSp>
+        <p:nvCxnSpPr>
+          <p:cNvPr id="106" name="Connector: Curved 105">
+            <a:extLst>
+              <a:ext uri="{FF2B5EF4-FFF2-40B4-BE49-F238E27FC236}">
+                <a16:creationId xmlns:a16="http://schemas.microsoft.com/office/drawing/2014/main" id="{38519E07-9814-45DE-8F54-B74E8EFEB8F7}"/>
+              </a:ext>
+            </a:extLst>
+          </p:cNvPr>
+          <p:cNvCxnSpPr>
+            <a:cxnSpLocks/>
+            <a:stCxn id="15" idx="3"/>
+            <a:endCxn id="12" idx="0"/>
+          </p:cNvCxnSpPr>
+          <p:nvPr/>
+        </p:nvCxnSpPr>
+        <p:spPr>
+          <a:xfrm>
+            <a:off x="4685085" y="1836125"/>
+            <a:ext cx="5609350" cy="1390066"/>
+          </a:xfrm>
+          <a:prstGeom prst="curvedConnector2">
+            <a:avLst/>
+          </a:prstGeom>
+          <a:ln>
+            <a:prstDash val="dash"/>
+            <a:tailEnd type="arrow" w="lg" len="lg"/>
+          </a:ln>
+        </p:spPr>
+        <p:style>
+          <a:lnRef idx="1">
+            <a:schemeClr val="accent1"/>
+          </a:lnRef>
+          <a:fillRef idx="0">
+            <a:schemeClr val="accent1"/>
+          </a:fillRef>
+          <a:effectRef idx="0">
+            <a:schemeClr val="accent1"/>
+          </a:effectRef>
+          <a:fontRef idx="minor">
+            <a:schemeClr val="tx1"/>
+          </a:fontRef>
+        </p:style>
+      </p:cxnSp>
+      <p:sp>
+        <p:nvSpPr>
+          <p:cNvPr id="110" name="TextBox 109">
+            <a:extLst>
+              <a:ext uri="{FF2B5EF4-FFF2-40B4-BE49-F238E27FC236}">
+                <a16:creationId xmlns:a16="http://schemas.microsoft.com/office/drawing/2014/main" id="{8856B0F9-F83E-45D3-8CAF-995CA4A37218}"/>
+              </a:ext>
+            </a:extLst>
+          </p:cNvPr>
+          <p:cNvSpPr txBox="1"/>
+          <p:nvPr/>
+        </p:nvSpPr>
+        <p:spPr>
+          <a:xfrm>
+            <a:off x="4661306" y="1870219"/>
+            <a:ext cx="902042" cy="307777"/>
+          </a:xfrm>
+          <a:prstGeom prst="rect">
+            <a:avLst/>
+          </a:prstGeom>
+          <a:noFill/>
+        </p:spPr>
+        <p:txBody>
+          <a:bodyPr wrap="none" rtlCol="0">
+            <a:spAutoFit/>
+          </a:bodyPr>
+          <a:lstStyle/>
+          <a:p>
+            <a:r>
+              <a:rPr lang="en-GB" sz="1400" dirty="0"/>
+              <a:t>(optional)</a:t>
             </a:r>
           </a:p>
         </p:txBody>

</xml_diff>

<commit_message>
swagger and module dependencies, embedded camel fixes
</commit_message>
<xml_diff>
--- a/adocs/documentation/src/main/asciidoc/starter-app/_images/module-dependencies.pptx
+++ b/adocs/documentation/src/main/asciidoc/starter-app/_images/module-dependencies.pptx
@@ -3365,8 +3365,8 @@
         </p:nvSpPr>
         <p:spPr>
           <a:xfrm>
-            <a:off x="1808917" y="1006009"/>
-            <a:ext cx="3147773" cy="5802562"/>
+            <a:off x="1808917" y="847963"/>
+            <a:ext cx="3147773" cy="5960608"/>
           </a:xfrm>
           <a:prstGeom prst="rect">
             <a:avLst/>
@@ -3412,8 +3412,8 @@
         </p:nvSpPr>
         <p:spPr>
           <a:xfrm>
-            <a:off x="8672566" y="1490702"/>
-            <a:ext cx="3124854" cy="5031648"/>
+            <a:off x="8672566" y="2425148"/>
+            <a:ext cx="3124854" cy="4224715"/>
           </a:xfrm>
           <a:prstGeom prst="rect">
             <a:avLst/>
@@ -3437,7 +3437,7 @@
           </a:fontRef>
         </p:style>
         <p:txBody>
-          <a:bodyPr rtlCol="0" anchor="b" anchorCtr="0"/>
+          <a:bodyPr rtlCol="0" anchor="t" anchorCtr="0"/>
           <a:lstStyle/>
           <a:p>
             <a:pPr algn="r"/>
@@ -3469,7 +3469,7 @@
         </p:nvSpPr>
         <p:spPr>
           <a:xfrm>
-            <a:off x="2075852" y="3441284"/>
+            <a:off x="2075852" y="3053256"/>
             <a:ext cx="2604565" cy="690847"/>
           </a:xfrm>
           <a:prstGeom prst="rect">
@@ -3530,8 +3530,8 @@
         </p:nvSpPr>
         <p:spPr>
           <a:xfrm>
-            <a:off x="5198637" y="1490701"/>
-            <a:ext cx="3206130" cy="5031648"/>
+            <a:off x="5198637" y="1202468"/>
+            <a:ext cx="3206130" cy="5447396"/>
           </a:xfrm>
           <a:prstGeom prst="rect">
             <a:avLst/>
@@ -3555,7 +3555,7 @@
           </a:fontRef>
         </p:style>
         <p:txBody>
-          <a:bodyPr rtlCol="0" anchor="b" anchorCtr="0"/>
+          <a:bodyPr rtlCol="0" anchor="t" anchorCtr="0"/>
           <a:lstStyle/>
           <a:p>
             <a:pPr algn="r"/>
@@ -3587,7 +3587,7 @@
         </p:nvSpPr>
         <p:spPr>
           <a:xfrm>
-            <a:off x="5413141" y="2437968"/>
+            <a:off x="5420419" y="2024438"/>
             <a:ext cx="2604565" cy="690847"/>
           </a:xfrm>
           <a:prstGeom prst="rect">
@@ -3652,7 +3652,7 @@
         </p:nvSpPr>
         <p:spPr>
           <a:xfrm>
-            <a:off x="8992152" y="4805585"/>
+            <a:off x="8992149" y="5268169"/>
             <a:ext cx="2604565" cy="690847"/>
           </a:xfrm>
           <a:prstGeom prst="rect">
@@ -3712,7 +3712,7 @@
         </p:nvSpPr>
         <p:spPr>
           <a:xfrm>
-            <a:off x="5420419" y="5188413"/>
+            <a:off x="5420419" y="5268169"/>
             <a:ext cx="2604565" cy="690847"/>
           </a:xfrm>
           <a:prstGeom prst="rect">
@@ -3777,7 +3777,7 @@
         </p:nvSpPr>
         <p:spPr>
           <a:xfrm>
-            <a:off x="8992152" y="3226191"/>
+            <a:off x="8992150" y="3663281"/>
             <a:ext cx="2604565" cy="690847"/>
           </a:xfrm>
           <a:prstGeom prst="rect">
@@ -3842,7 +3842,7 @@
         </p:nvSpPr>
         <p:spPr>
           <a:xfrm>
-            <a:off x="2071888" y="4703561"/>
+            <a:off x="2075852" y="4635317"/>
             <a:ext cx="2604565" cy="690847"/>
           </a:xfrm>
           <a:prstGeom prst="rect">
@@ -3902,7 +3902,7 @@
         </p:nvSpPr>
         <p:spPr>
           <a:xfrm>
-            <a:off x="2080520" y="1490701"/>
+            <a:off x="2080520" y="1202467"/>
             <a:ext cx="2604565" cy="690847"/>
           </a:xfrm>
           <a:prstGeom prst="rect">
@@ -3967,8 +3967,8 @@
         </p:nvCxnSpPr>
         <p:spPr>
           <a:xfrm rot="5400000">
-            <a:off x="2750601" y="2809082"/>
-            <a:ext cx="1259736" cy="4668"/>
+            <a:off x="2800498" y="2470951"/>
+            <a:ext cx="1159942" cy="4668"/>
           </a:xfrm>
           <a:prstGeom prst="curvedConnector3">
             <a:avLst>
@@ -4013,8 +4013,8 @@
         </p:nvCxnSpPr>
         <p:spPr>
           <a:xfrm>
-            <a:off x="4685085" y="1836125"/>
-            <a:ext cx="2030339" cy="601843"/>
+            <a:off x="4685085" y="1547891"/>
+            <a:ext cx="2037617" cy="476547"/>
           </a:xfrm>
           <a:prstGeom prst="curvedConnector2">
             <a:avLst/>
@@ -4057,8 +4057,8 @@
         </p:nvCxnSpPr>
         <p:spPr>
           <a:xfrm rot="5400000">
-            <a:off x="5368975" y="2440258"/>
-            <a:ext cx="657893" cy="2035007"/>
+            <a:off x="5359863" y="2035840"/>
+            <a:ext cx="683395" cy="2042285"/>
           </a:xfrm>
           <a:prstGeom prst="curvedConnector2">
             <a:avLst/>
@@ -4101,8 +4101,8 @@
         </p:nvCxnSpPr>
         <p:spPr>
           <a:xfrm rot="5400000">
-            <a:off x="9850162" y="4361311"/>
-            <a:ext cx="888547" cy="12700"/>
+            <a:off x="9837413" y="4811148"/>
+            <a:ext cx="914041" cy="1"/>
           </a:xfrm>
           <a:prstGeom prst="curvedConnector3">
             <a:avLst>
@@ -4146,9 +4146,9 @@
           <p:nvPr/>
         </p:nvCxnSpPr>
         <p:spPr>
-          <a:xfrm rot="16200000" flipH="1">
-            <a:off x="5689264" y="4154975"/>
-            <a:ext cx="2059598" cy="7278"/>
+          <a:xfrm rot="5400000">
+            <a:off x="5446260" y="3991727"/>
+            <a:ext cx="2552884" cy="12700"/>
           </a:xfrm>
           <a:prstGeom prst="curvedConnector3">
             <a:avLst>
@@ -4193,8 +4193,8 @@
         </p:nvCxnSpPr>
         <p:spPr>
           <a:xfrm rot="16200000" flipH="1">
-            <a:off x="7632388" y="2211851"/>
-            <a:ext cx="442800" cy="2276728"/>
+            <a:off x="7210716" y="2227271"/>
+            <a:ext cx="1293420" cy="2269448"/>
           </a:xfrm>
           <a:prstGeom prst="curvedConnector2">
             <a:avLst/>
@@ -4237,8 +4237,8 @@
         </p:nvCxnSpPr>
         <p:spPr>
           <a:xfrm rot="5400000">
-            <a:off x="3090438" y="4415864"/>
-            <a:ext cx="571430" cy="3964"/>
+            <a:off x="2932528" y="4189710"/>
+            <a:ext cx="891214" cy="12700"/>
           </a:xfrm>
           <a:prstGeom prst="curvedConnector3">
             <a:avLst>
@@ -4576,7 +4576,7 @@
         </p:nvSpPr>
         <p:spPr>
           <a:xfrm>
-            <a:off x="5195215" y="3378385"/>
+            <a:off x="5258637" y="2953915"/>
             <a:ext cx="899092" cy="307777"/>
           </a:xfrm>
           <a:prstGeom prst="rect">
@@ -4646,7 +4646,7 @@
         </p:nvSpPr>
         <p:spPr>
           <a:xfrm>
-            <a:off x="2054867" y="5965838"/>
+            <a:off x="2082203" y="5959016"/>
             <a:ext cx="2604565" cy="690847"/>
           </a:xfrm>
           <a:prstGeom prst="rect">
@@ -4709,9 +4709,9 @@
           <p:nvPr/>
         </p:nvCxnSpPr>
         <p:spPr>
-          <a:xfrm rot="5400000">
-            <a:off x="3079946" y="5671613"/>
-            <a:ext cx="571430" cy="17021"/>
+          <a:xfrm rot="16200000" flipH="1">
+            <a:off x="3064884" y="5639414"/>
+            <a:ext cx="632852" cy="6351"/>
           </a:xfrm>
           <a:prstGeom prst="curvedConnector3">
             <a:avLst>
@@ -4756,8 +4756,8 @@
         </p:nvCxnSpPr>
         <p:spPr>
           <a:xfrm rot="5400000">
-            <a:off x="5475066" y="5063626"/>
-            <a:ext cx="432002" cy="2063270"/>
+            <a:off x="5532023" y="5113761"/>
+            <a:ext cx="345424" cy="2035934"/>
           </a:xfrm>
           <a:prstGeom prst="curvedConnector2">
             <a:avLst/>
@@ -4994,7 +4994,7 @@
         <p:spPr>
           <a:xfrm rot="10800000" flipV="1">
             <a:off x="3382804" y="467859"/>
-            <a:ext cx="2787202" cy="538150"/>
+            <a:ext cx="2787202" cy="380104"/>
           </a:xfrm>
           <a:prstGeom prst="curvedConnector2">
             <a:avLst/>
@@ -5038,7 +5038,7 @@
         <p:spPr>
           <a:xfrm>
             <a:off x="7275396" y="467859"/>
-            <a:ext cx="2959597" cy="1022843"/>
+            <a:ext cx="2959597" cy="1957289"/>
           </a:xfrm>
           <a:prstGeom prst="curvedConnector2">
             <a:avLst/>
@@ -5252,8 +5252,8 @@
         </p:nvCxnSpPr>
         <p:spPr>
           <a:xfrm rot="5400000">
-            <a:off x="6919471" y="1674020"/>
-            <a:ext cx="1131947" cy="5617982"/>
+            <a:off x="7174119" y="1860426"/>
+            <a:ext cx="626613" cy="5614016"/>
           </a:xfrm>
           <a:prstGeom prst="curvedConnector2">
             <a:avLst/>
@@ -5289,15 +5289,15 @@
           </p:cNvPr>
           <p:cNvCxnSpPr>
             <a:cxnSpLocks/>
-            <a:stCxn id="15" idx="3"/>
-            <a:endCxn id="12" idx="0"/>
+            <a:stCxn id="4" idx="2"/>
+            <a:endCxn id="12" idx="1"/>
           </p:cNvCxnSpPr>
           <p:nvPr/>
         </p:nvCxnSpPr>
         <p:spPr>
-          <a:xfrm>
-            <a:off x="4685085" y="1836125"/>
-            <a:ext cx="5609350" cy="1390066"/>
+          <a:xfrm rot="16200000" flipH="1">
+            <a:off x="6052841" y="1069396"/>
+            <a:ext cx="264602" cy="5614015"/>
           </a:xfrm>
           <a:prstGeom prst="curvedConnector2">
             <a:avLst/>
@@ -5336,7 +5336,42 @@
         </p:nvSpPr>
         <p:spPr>
           <a:xfrm>
-            <a:off x="4661306" y="1870219"/>
+            <a:off x="4661306" y="1581985"/>
+            <a:ext cx="902042" cy="307777"/>
+          </a:xfrm>
+          <a:prstGeom prst="rect">
+            <a:avLst/>
+          </a:prstGeom>
+          <a:noFill/>
+        </p:spPr>
+        <p:txBody>
+          <a:bodyPr wrap="none" rtlCol="0">
+            <a:spAutoFit/>
+          </a:bodyPr>
+          <a:lstStyle/>
+          <a:p>
+            <a:r>
+              <a:rPr lang="en-GB" sz="1400" dirty="0"/>
+              <a:t>(optional)</a:t>
+            </a:r>
+          </a:p>
+        </p:txBody>
+      </p:sp>
+      <p:sp>
+        <p:nvSpPr>
+          <p:cNvPr id="46" name="TextBox 45">
+            <a:extLst>
+              <a:ext uri="{FF2B5EF4-FFF2-40B4-BE49-F238E27FC236}">
+                <a16:creationId xmlns:a16="http://schemas.microsoft.com/office/drawing/2014/main" id="{D7630F3E-F103-4873-9F6A-6A9F01A8DE6C}"/>
+              </a:ext>
+            </a:extLst>
+          </p:cNvPr>
+          <p:cNvSpPr txBox="1"/>
+          <p:nvPr/>
+        </p:nvSpPr>
+        <p:spPr>
+          <a:xfrm>
+            <a:off x="3977910" y="3907111"/>
             <a:ext cx="902042" cy="307777"/>
           </a:xfrm>
           <a:prstGeom prst="rect">

</xml_diff>